<commit_message>
fix 4-th and 5-th lectures
</commit_message>
<xml_diff>
--- a/4. Complex-Conditions/4. Complex-Conditions.pptx
+++ b/4. Complex-Conditions/4. Complex-Conditions.pptx
@@ -140,7 +140,7 @@
   </p:defaultTextStyle>
   <p:extLst>
     <p:ext uri="{EFAFB233-063F-42B5-8137-9DF3F51BA10A}">
-      <p15:sldGuideLst xmlns:p15="http://schemas.microsoft.com/office/powerpoint/2012/main" xmlns="">
+      <p15:sldGuideLst xmlns="" xmlns:p15="http://schemas.microsoft.com/office/powerpoint/2012/main">
         <p15:guide id="1" orient="horz" pos="2160" userDrawn="1">
           <p15:clr>
             <a:srgbClr val="A4A3A4"/>
@@ -154,7 +154,7 @@
       </p15:sldGuideLst>
     </p:ext>
     <p:ext uri="{2D200454-40CA-4A62-9FC3-DE9A4176ACB9}">
-      <p15:notesGuideLst xmlns:p15="http://schemas.microsoft.com/office/powerpoint/2012/main" xmlns="">
+      <p15:notesGuideLst xmlns="" xmlns:p15="http://schemas.microsoft.com/office/powerpoint/2012/main">
         <p15:guide id="1" orient="horz" pos="2880">
           <p15:clr>
             <a:srgbClr val="A4A3A4"/>
@@ -254,7 +254,7 @@
             <a:fld id="{FE5B4EDC-59C0-49C7-8ADA-5A781B329E02}" type="datetimeFigureOut">
               <a:rPr lang="en-US"/>
               <a:pPr/>
-              <a:t>5/17/2017</a:t>
+              <a:t>5/31/2017</a:t>
             </a:fld>
             <a:endParaRPr dirty="0"/>
           </a:p>
@@ -453,7 +453,7 @@
             <a:fld id="{F2D8D46A-B586-417D-BFBD-8C8FE0AAF762}" type="datetimeFigureOut">
               <a:rPr lang="en-US" smtClean="0"/>
               <a:pPr/>
-              <a:t>5/17/2017</a:t>
+              <a:t>5/31/2017</a:t>
             </a:fld>
             <a:endParaRPr lang="en-US"/>
           </a:p>
@@ -2171,7 +2171,7 @@
             <a:fld id="{055373AC-9AA7-423B-BA00-BA1C74164DBD}" type="datetime1">
               <a:rPr lang="en-US" smtClean="0"/>
               <a:pPr/>
-              <a:t>5/17/2017</a:t>
+              <a:t>5/31/2017</a:t>
             </a:fld>
             <a:endParaRPr lang="en-US" dirty="0"/>
           </a:p>
@@ -3339,7 +3339,7 @@
             <a:fld id="{055373AC-9AA7-423B-BA00-BA1C74164DBD}" type="datetime1">
               <a:rPr lang="en-US" smtClean="0"/>
               <a:pPr/>
-              <a:t>5/17/2017</a:t>
+              <a:t>5/31/2017</a:t>
             </a:fld>
             <a:endParaRPr lang="en-US" dirty="0"/>
           </a:p>
@@ -3868,7 +3868,7 @@
   </p:txStyles>
   <p:extLst mod="1">
     <p:ext uri="{27BBF7A9-308A-43DC-89C8-2F10F3537804}">
-      <p15:sldGuideLst xmlns:p15="http://schemas.microsoft.com/office/powerpoint/2012/main" xmlns="">
+      <p15:sldGuideLst xmlns="" xmlns:p15="http://schemas.microsoft.com/office/powerpoint/2012/main">
         <p15:guide id="1" orient="horz" pos="2160" userDrawn="1">
           <p15:clr>
             <a:srgbClr val="F26B43"/>
@@ -7287,13 +7287,7 @@
               <a:rPr lang="en-US" dirty="0" smtClean="0">
                 <a:hlinkClick r:id="rId2"/>
               </a:rPr>
-              <a:t>judge.softuni.bg/Contests/Practice/Index/531#</a:t>
-            </a:r>
-            <a:r>
-              <a:rPr lang="en-US" dirty="0" smtClean="0">
-                <a:hlinkClick r:id="rId2"/>
-              </a:rPr>
-              <a:t>9</a:t>
+              <a:t>judge.softuni.bg/Contests/Practice/Index/531#9</a:t>
             </a:r>
             <a:r>
               <a:rPr lang="en-US" dirty="0" smtClean="0"/>
@@ -8705,13 +8699,7 @@
               <a:rPr lang="en-US" dirty="0" smtClean="0">
                 <a:hlinkClick r:id="rId2"/>
               </a:rPr>
-              <a:t>judge.softuni.bg/Contests/Practice/Index/531#</a:t>
-            </a:r>
-            <a:r>
-              <a:rPr lang="en-US" dirty="0" smtClean="0">
-                <a:hlinkClick r:id="rId2"/>
-              </a:rPr>
-              <a:t>8</a:t>
+              <a:t>judge.softuni.bg/Contests/Practice/Index/531#8</a:t>
             </a:r>
             <a:r>
               <a:rPr lang="en-US" dirty="0" smtClean="0"/>
@@ -10841,13 +10829,7 @@
               <a:rPr lang="en-US" dirty="0" smtClean="0">
                 <a:hlinkClick r:id="rId3"/>
               </a:rPr>
-              <a:t>judge.softuni.bg/Contests/Practice/Index/531#</a:t>
-            </a:r>
-            <a:r>
-              <a:rPr lang="en-US" dirty="0" smtClean="0">
-                <a:hlinkClick r:id="rId3"/>
-              </a:rPr>
-              <a:t>11</a:t>
+              <a:t>judge.softuni.bg/Contests/Practice/Index/531#11</a:t>
             </a:r>
             <a:r>
               <a:rPr lang="en-US" dirty="0" smtClean="0"/>
@@ -11500,56 +11482,56 @@
                 <a:gridCol w="983996">
                   <a:extLst>
                     <a:ext uri="{9D8B030D-6E8A-4147-A177-3AD203B41FA5}">
-                      <a16:colId xmlns:a16="http://schemas.microsoft.com/office/drawing/2014/main" xmlns="" val="20000"/>
+                      <a16:colId xmlns="" xmlns:a16="http://schemas.microsoft.com/office/drawing/2014/main" val="20000"/>
                     </a:ext>
                   </a:extLst>
                 </a:gridCol>
                 <a:gridCol w="1318260">
                   <a:extLst>
                     <a:ext uri="{9D8B030D-6E8A-4147-A177-3AD203B41FA5}">
-                      <a16:colId xmlns:a16="http://schemas.microsoft.com/office/drawing/2014/main" xmlns="" val="20001"/>
+                      <a16:colId xmlns="" xmlns:a16="http://schemas.microsoft.com/office/drawing/2014/main" val="20001"/>
                     </a:ext>
                   </a:extLst>
                 </a:gridCol>
                 <a:gridCol w="1042035">
                   <a:extLst>
                     <a:ext uri="{9D8B030D-6E8A-4147-A177-3AD203B41FA5}">
-                      <a16:colId xmlns:a16="http://schemas.microsoft.com/office/drawing/2014/main" xmlns="" val="20002"/>
+                      <a16:colId xmlns="" xmlns:a16="http://schemas.microsoft.com/office/drawing/2014/main" val="20002"/>
                     </a:ext>
                   </a:extLst>
                 </a:gridCol>
                 <a:gridCol w="1238377">
                   <a:extLst>
                     <a:ext uri="{9D8B030D-6E8A-4147-A177-3AD203B41FA5}">
-                      <a16:colId xmlns:a16="http://schemas.microsoft.com/office/drawing/2014/main" xmlns="" val="20003"/>
+                      <a16:colId xmlns="" xmlns:a16="http://schemas.microsoft.com/office/drawing/2014/main" val="20003"/>
                     </a:ext>
                   </a:extLst>
                 </a:gridCol>
                 <a:gridCol w="1690433">
                   <a:extLst>
                     <a:ext uri="{9D8B030D-6E8A-4147-A177-3AD203B41FA5}">
-                      <a16:colId xmlns:a16="http://schemas.microsoft.com/office/drawing/2014/main" xmlns="" val="20004"/>
+                      <a16:colId xmlns="" xmlns:a16="http://schemas.microsoft.com/office/drawing/2014/main" val="20004"/>
                     </a:ext>
                   </a:extLst>
                 </a:gridCol>
                 <a:gridCol w="851535">
                   <a:extLst>
                     <a:ext uri="{9D8B030D-6E8A-4147-A177-3AD203B41FA5}">
-                      <a16:colId xmlns:a16="http://schemas.microsoft.com/office/drawing/2014/main" xmlns="" val="20005"/>
+                      <a16:colId xmlns="" xmlns:a16="http://schemas.microsoft.com/office/drawing/2014/main" val="20005"/>
                     </a:ext>
                   </a:extLst>
                 </a:gridCol>
                 <a:gridCol w="1689735">
                   <a:extLst>
                     <a:ext uri="{9D8B030D-6E8A-4147-A177-3AD203B41FA5}">
-                      <a16:colId xmlns:a16="http://schemas.microsoft.com/office/drawing/2014/main" xmlns="" val="20006"/>
+                      <a16:colId xmlns="" xmlns:a16="http://schemas.microsoft.com/office/drawing/2014/main" val="20006"/>
                     </a:ext>
                   </a:extLst>
                 </a:gridCol>
                 <a:gridCol w="1192975">
                   <a:extLst>
                     <a:ext uri="{9D8B030D-6E8A-4147-A177-3AD203B41FA5}">
-                      <a16:colId xmlns:a16="http://schemas.microsoft.com/office/drawing/2014/main" xmlns="" val="20007"/>
+                      <a16:colId xmlns="" xmlns:a16="http://schemas.microsoft.com/office/drawing/2014/main" val="20007"/>
                     </a:ext>
                   </a:extLst>
                 </a:gridCol>
@@ -12007,7 +11989,7 @@
                 </a:tc>
                 <a:extLst>
                   <a:ext uri="{0D108BD9-81ED-4DB2-BD59-A6C34878D82A}">
-                    <a16:rowId xmlns:a16="http://schemas.microsoft.com/office/drawing/2014/main" xmlns="" val="10000"/>
+                    <a16:rowId xmlns="" xmlns:a16="http://schemas.microsoft.com/office/drawing/2014/main" val="10000"/>
                   </a:ext>
                 </a:extLst>
               </a:tr>
@@ -12380,7 +12362,7 @@
                 </a:tc>
                 <a:extLst>
                   <a:ext uri="{0D108BD9-81ED-4DB2-BD59-A6C34878D82A}">
-                    <a16:rowId xmlns:a16="http://schemas.microsoft.com/office/drawing/2014/main" xmlns="" val="10001"/>
+                    <a16:rowId xmlns="" xmlns:a16="http://schemas.microsoft.com/office/drawing/2014/main" val="10001"/>
                   </a:ext>
                 </a:extLst>
               </a:tr>
@@ -12410,56 +12392,56 @@
                 <a:gridCol w="983996">
                   <a:extLst>
                     <a:ext uri="{9D8B030D-6E8A-4147-A177-3AD203B41FA5}">
-                      <a16:colId xmlns:a16="http://schemas.microsoft.com/office/drawing/2014/main" xmlns="" val="20000"/>
+                      <a16:colId xmlns="" xmlns:a16="http://schemas.microsoft.com/office/drawing/2014/main" val="20000"/>
                     </a:ext>
                   </a:extLst>
                 </a:gridCol>
                 <a:gridCol w="1318260">
                   <a:extLst>
                     <a:ext uri="{9D8B030D-6E8A-4147-A177-3AD203B41FA5}">
-                      <a16:colId xmlns:a16="http://schemas.microsoft.com/office/drawing/2014/main" xmlns="" val="20001"/>
+                      <a16:colId xmlns="" xmlns:a16="http://schemas.microsoft.com/office/drawing/2014/main" val="20001"/>
                     </a:ext>
                   </a:extLst>
                 </a:gridCol>
                 <a:gridCol w="1042035">
                   <a:extLst>
                     <a:ext uri="{9D8B030D-6E8A-4147-A177-3AD203B41FA5}">
-                      <a16:colId xmlns:a16="http://schemas.microsoft.com/office/drawing/2014/main" xmlns="" val="20002"/>
+                      <a16:colId xmlns="" xmlns:a16="http://schemas.microsoft.com/office/drawing/2014/main" val="20002"/>
                     </a:ext>
                   </a:extLst>
                 </a:gridCol>
                 <a:gridCol w="1238377">
                   <a:extLst>
                     <a:ext uri="{9D8B030D-6E8A-4147-A177-3AD203B41FA5}">
-                      <a16:colId xmlns:a16="http://schemas.microsoft.com/office/drawing/2014/main" xmlns="" val="20003"/>
+                      <a16:colId xmlns="" xmlns:a16="http://schemas.microsoft.com/office/drawing/2014/main" val="20003"/>
                     </a:ext>
                   </a:extLst>
                 </a:gridCol>
                 <a:gridCol w="1690433">
                   <a:extLst>
                     <a:ext uri="{9D8B030D-6E8A-4147-A177-3AD203B41FA5}">
-                      <a16:colId xmlns:a16="http://schemas.microsoft.com/office/drawing/2014/main" xmlns="" val="20004"/>
+                      <a16:colId xmlns="" xmlns:a16="http://schemas.microsoft.com/office/drawing/2014/main" val="20004"/>
                     </a:ext>
                   </a:extLst>
                 </a:gridCol>
                 <a:gridCol w="851535">
                   <a:extLst>
                     <a:ext uri="{9D8B030D-6E8A-4147-A177-3AD203B41FA5}">
-                      <a16:colId xmlns:a16="http://schemas.microsoft.com/office/drawing/2014/main" xmlns="" val="20005"/>
+                      <a16:colId xmlns="" xmlns:a16="http://schemas.microsoft.com/office/drawing/2014/main" val="20005"/>
                     </a:ext>
                   </a:extLst>
                 </a:gridCol>
                 <a:gridCol w="1689735">
                   <a:extLst>
                     <a:ext uri="{9D8B030D-6E8A-4147-A177-3AD203B41FA5}">
-                      <a16:colId xmlns:a16="http://schemas.microsoft.com/office/drawing/2014/main" xmlns="" val="20006"/>
+                      <a16:colId xmlns="" xmlns:a16="http://schemas.microsoft.com/office/drawing/2014/main" val="20006"/>
                     </a:ext>
                   </a:extLst>
                 </a:gridCol>
                 <a:gridCol w="1192975">
                   <a:extLst>
                     <a:ext uri="{9D8B030D-6E8A-4147-A177-3AD203B41FA5}">
-                      <a16:colId xmlns:a16="http://schemas.microsoft.com/office/drawing/2014/main" xmlns="" val="20007"/>
+                      <a16:colId xmlns="" xmlns:a16="http://schemas.microsoft.com/office/drawing/2014/main" val="20007"/>
                     </a:ext>
                   </a:extLst>
                 </a:gridCol>
@@ -12925,7 +12907,7 @@
                 </a:tc>
                 <a:extLst>
                   <a:ext uri="{0D108BD9-81ED-4DB2-BD59-A6C34878D82A}">
-                    <a16:rowId xmlns:a16="http://schemas.microsoft.com/office/drawing/2014/main" xmlns="" val="10000"/>
+                    <a16:rowId xmlns="" xmlns:a16="http://schemas.microsoft.com/office/drawing/2014/main" val="10000"/>
                   </a:ext>
                 </a:extLst>
               </a:tr>
@@ -13278,7 +13260,7 @@
                 </a:tc>
                 <a:extLst>
                   <a:ext uri="{0D108BD9-81ED-4DB2-BD59-A6C34878D82A}">
-                    <a16:rowId xmlns:a16="http://schemas.microsoft.com/office/drawing/2014/main" xmlns="" val="10001"/>
+                    <a16:rowId xmlns="" xmlns:a16="http://schemas.microsoft.com/office/drawing/2014/main" val="10001"/>
                   </a:ext>
                 </a:extLst>
               </a:tr>
@@ -14526,35 +14508,35 @@
                 <a:gridCol w="1998367">
                   <a:extLst>
                     <a:ext uri="{9D8B030D-6E8A-4147-A177-3AD203B41FA5}">
-                      <a16:colId xmlns:a16="http://schemas.microsoft.com/office/drawing/2014/main" xmlns="" val="20000"/>
+                      <a16:colId xmlns="" xmlns:a16="http://schemas.microsoft.com/office/drawing/2014/main" val="20000"/>
                     </a:ext>
                   </a:extLst>
                 </a:gridCol>
                 <a:gridCol w="1767273">
                   <a:extLst>
                     <a:ext uri="{9D8B030D-6E8A-4147-A177-3AD203B41FA5}">
-                      <a16:colId xmlns:a16="http://schemas.microsoft.com/office/drawing/2014/main" xmlns="" val="20001"/>
+                      <a16:colId xmlns="" xmlns:a16="http://schemas.microsoft.com/office/drawing/2014/main" val="20001"/>
                     </a:ext>
                   </a:extLst>
                 </a:gridCol>
                 <a:gridCol w="2386947">
                   <a:extLst>
                     <a:ext uri="{9D8B030D-6E8A-4147-A177-3AD203B41FA5}">
-                      <a16:colId xmlns:a16="http://schemas.microsoft.com/office/drawing/2014/main" xmlns="" val="20002"/>
+                      <a16:colId xmlns="" xmlns:a16="http://schemas.microsoft.com/office/drawing/2014/main" val="20002"/>
                     </a:ext>
                   </a:extLst>
                 </a:gridCol>
                 <a:gridCol w="2826883">
                   <a:extLst>
                     <a:ext uri="{9D8B030D-6E8A-4147-A177-3AD203B41FA5}">
-                      <a16:colId xmlns:a16="http://schemas.microsoft.com/office/drawing/2014/main" xmlns="" val="20003"/>
+                      <a16:colId xmlns="" xmlns:a16="http://schemas.microsoft.com/office/drawing/2014/main" val="20003"/>
                     </a:ext>
                   </a:extLst>
                 </a:gridCol>
                 <a:gridCol w="1688530">
                   <a:extLst>
                     <a:ext uri="{9D8B030D-6E8A-4147-A177-3AD203B41FA5}">
-                      <a16:colId xmlns:a16="http://schemas.microsoft.com/office/drawing/2014/main" xmlns="" val="20004"/>
+                      <a16:colId xmlns="" xmlns:a16="http://schemas.microsoft.com/office/drawing/2014/main" val="20004"/>
                     </a:ext>
                   </a:extLst>
                 </a:gridCol>
@@ -14982,7 +14964,7 @@
                 </a:tc>
                 <a:extLst>
                   <a:ext uri="{0D108BD9-81ED-4DB2-BD59-A6C34878D82A}">
-                    <a16:rowId xmlns:a16="http://schemas.microsoft.com/office/drawing/2014/main" xmlns="" val="10000"/>
+                    <a16:rowId xmlns="" xmlns:a16="http://schemas.microsoft.com/office/drawing/2014/main" val="10000"/>
                   </a:ext>
                 </a:extLst>
               </a:tr>
@@ -15181,7 +15163,7 @@
                 </a:tc>
                 <a:extLst>
                   <a:ext uri="{0D108BD9-81ED-4DB2-BD59-A6C34878D82A}">
-                    <a16:rowId xmlns:a16="http://schemas.microsoft.com/office/drawing/2014/main" xmlns="" val="10001"/>
+                    <a16:rowId xmlns="" xmlns:a16="http://schemas.microsoft.com/office/drawing/2014/main" val="10001"/>
                   </a:ext>
                 </a:extLst>
               </a:tr>
@@ -15380,7 +15362,7 @@
                 </a:tc>
                 <a:extLst>
                   <a:ext uri="{0D108BD9-81ED-4DB2-BD59-A6C34878D82A}">
-                    <a16:rowId xmlns:a16="http://schemas.microsoft.com/office/drawing/2014/main" xmlns="" val="10002"/>
+                    <a16:rowId xmlns="" xmlns:a16="http://schemas.microsoft.com/office/drawing/2014/main" val="10002"/>
                   </a:ext>
                 </a:extLst>
               </a:tr>
@@ -15627,7 +15609,7 @@
                 </a:tc>
                 <a:extLst>
                   <a:ext uri="{0D108BD9-81ED-4DB2-BD59-A6C34878D82A}">
-                    <a16:rowId xmlns:a16="http://schemas.microsoft.com/office/drawing/2014/main" xmlns="" val="10003"/>
+                    <a16:rowId xmlns="" xmlns:a16="http://schemas.microsoft.com/office/drawing/2014/main" val="10003"/>
                   </a:ext>
                 </a:extLst>
               </a:tr>
@@ -21860,42 +21842,42 @@
                 <a:gridCol w="2313305">
                   <a:extLst>
                     <a:ext uri="{9D8B030D-6E8A-4147-A177-3AD203B41FA5}">
-                      <a16:colId xmlns:a16="http://schemas.microsoft.com/office/drawing/2014/main" xmlns="" val="20000"/>
+                      <a16:colId xmlns="" xmlns:a16="http://schemas.microsoft.com/office/drawing/2014/main" val="20000"/>
                     </a:ext>
                   </a:extLst>
                 </a:gridCol>
                 <a:gridCol w="1436284">
                   <a:extLst>
                     <a:ext uri="{9D8B030D-6E8A-4147-A177-3AD203B41FA5}">
-                      <a16:colId xmlns:a16="http://schemas.microsoft.com/office/drawing/2014/main" xmlns="" val="20001"/>
+                      <a16:colId xmlns="" xmlns:a16="http://schemas.microsoft.com/office/drawing/2014/main" val="20001"/>
                     </a:ext>
                   </a:extLst>
                 </a:gridCol>
                 <a:gridCol w="1135329">
                   <a:extLst>
                     <a:ext uri="{9D8B030D-6E8A-4147-A177-3AD203B41FA5}">
-                      <a16:colId xmlns:a16="http://schemas.microsoft.com/office/drawing/2014/main" xmlns="" val="20002"/>
+                      <a16:colId xmlns="" xmlns:a16="http://schemas.microsoft.com/office/drawing/2014/main" val="20002"/>
                     </a:ext>
                   </a:extLst>
                 </a:gridCol>
                 <a:gridCol w="1349250">
                   <a:extLst>
                     <a:ext uri="{9D8B030D-6E8A-4147-A177-3AD203B41FA5}">
-                      <a16:colId xmlns:a16="http://schemas.microsoft.com/office/drawing/2014/main" xmlns="" val="20003"/>
+                      <a16:colId xmlns="" xmlns:a16="http://schemas.microsoft.com/office/drawing/2014/main" val="20003"/>
                     </a:ext>
                   </a:extLst>
                 </a:gridCol>
                 <a:gridCol w="1266642">
                   <a:extLst>
                     <a:ext uri="{9D8B030D-6E8A-4147-A177-3AD203B41FA5}">
-                      <a16:colId xmlns:a16="http://schemas.microsoft.com/office/drawing/2014/main" xmlns="" val="20004"/>
+                      <a16:colId xmlns="" xmlns:a16="http://schemas.microsoft.com/office/drawing/2014/main" val="20004"/>
                     </a:ext>
                   </a:extLst>
                 </a:gridCol>
                 <a:gridCol w="1439744">
                   <a:extLst>
                     <a:ext uri="{9D8B030D-6E8A-4147-A177-3AD203B41FA5}">
-                      <a16:colId xmlns:a16="http://schemas.microsoft.com/office/drawing/2014/main" xmlns="" val="20005"/>
+                      <a16:colId xmlns="" xmlns:a16="http://schemas.microsoft.com/office/drawing/2014/main" val="20005"/>
                     </a:ext>
                   </a:extLst>
                 </a:gridCol>
@@ -22239,7 +22221,7 @@
                 </a:tc>
                 <a:extLst>
                   <a:ext uri="{0D108BD9-81ED-4DB2-BD59-A6C34878D82A}">
-                    <a16:rowId xmlns:a16="http://schemas.microsoft.com/office/drawing/2014/main" xmlns="" val="10000"/>
+                    <a16:rowId xmlns="" xmlns:a16="http://schemas.microsoft.com/office/drawing/2014/main" val="10000"/>
                   </a:ext>
                 </a:extLst>
               </a:tr>
@@ -22528,7 +22510,7 @@
                 </a:tc>
                 <a:extLst>
                   <a:ext uri="{0D108BD9-81ED-4DB2-BD59-A6C34878D82A}">
-                    <a16:rowId xmlns:a16="http://schemas.microsoft.com/office/drawing/2014/main" xmlns="" val="10001"/>
+                    <a16:rowId xmlns="" xmlns:a16="http://schemas.microsoft.com/office/drawing/2014/main" val="10001"/>
                   </a:ext>
                 </a:extLst>
               </a:tr>
@@ -22847,7 +22829,7 @@
                 </a:tc>
                 <a:extLst>
                   <a:ext uri="{0D108BD9-81ED-4DB2-BD59-A6C34878D82A}">
-                    <a16:rowId xmlns:a16="http://schemas.microsoft.com/office/drawing/2014/main" xmlns="" val="10002"/>
+                    <a16:rowId xmlns="" xmlns:a16="http://schemas.microsoft.com/office/drawing/2014/main" val="10002"/>
                   </a:ext>
                 </a:extLst>
               </a:tr>
@@ -23166,7 +23148,7 @@
                 </a:tc>
                 <a:extLst>
                   <a:ext uri="{0D108BD9-81ED-4DB2-BD59-A6C34878D82A}">
-                    <a16:rowId xmlns:a16="http://schemas.microsoft.com/office/drawing/2014/main" xmlns="" val="10003"/>
+                    <a16:rowId xmlns="" xmlns:a16="http://schemas.microsoft.com/office/drawing/2014/main" val="10003"/>
                   </a:ext>
                 </a:extLst>
               </a:tr>

</xml_diff>